<commit_message>
How To Play edited for detail; content added for powerpoint presentation and pdf
</commit_message>
<xml_diff>
--- a/presentation.pptx
+++ b/presentation.pptx
@@ -7,8 +7,13 @@
   <p:sldIdLst>
     <p:sldId id="256" r:id="rId2"/>
     <p:sldId id="257" r:id="rId3"/>
-    <p:sldId id="258" r:id="rId4"/>
-    <p:sldId id="259" r:id="rId5"/>
+    <p:sldId id="260" r:id="rId4"/>
+    <p:sldId id="258" r:id="rId5"/>
+    <p:sldId id="263" r:id="rId6"/>
+    <p:sldId id="262" r:id="rId7"/>
+    <p:sldId id="264" r:id="rId8"/>
+    <p:sldId id="265" r:id="rId9"/>
+    <p:sldId id="259" r:id="rId10"/>
   </p:sldIdLst>
   <p:sldSz cx="12192000" cy="6858000"/>
   <p:notesSz cx="6858000" cy="9144000"/>
@@ -389,7 +394,7 @@
           <a:p>
             <a:fld id="{78ABE3C1-DBE1-495D-B57B-2849774B866A}" type="datetimeFigureOut">
               <a:rPr lang="en-US" dirty="0"/>
-              <a:t>10/17/2019</a:t>
+              <a:t>10/17/19</a:t>
             </a:fld>
             <a:endParaRPr lang="en-US" dirty="0"/>
           </a:p>
@@ -798,7 +803,7 @@
           <a:p>
             <a:fld id="{446C117F-5CCF-4837-BE5F-2B92066CAFAF}" type="datetimeFigureOut">
               <a:rPr lang="en-US" dirty="0"/>
-              <a:t>10/17/2019</a:t>
+              <a:t>10/17/19</a:t>
             </a:fld>
             <a:endParaRPr lang="en-US" dirty="0"/>
           </a:p>
@@ -1129,7 +1134,7 @@
           <a:p>
             <a:fld id="{84EB90BD-B6CE-46B7-997F-7313B992CCDC}" type="datetimeFigureOut">
               <a:rPr lang="en-US" dirty="0"/>
-              <a:t>10/17/2019</a:t>
+              <a:t>10/17/19</a:t>
             </a:fld>
             <a:endParaRPr lang="en-US" dirty="0"/>
           </a:p>
@@ -1529,7 +1534,7 @@
           <a:p>
             <a:fld id="{CDB9D11F-B188-461D-B23F-39381795C052}" type="datetimeFigureOut">
               <a:rPr lang="en-US" dirty="0"/>
-              <a:t>10/17/2019</a:t>
+              <a:t>10/17/19</a:t>
             </a:fld>
             <a:endParaRPr lang="en-US" dirty="0"/>
           </a:p>
@@ -2092,7 +2097,7 @@
           <a:p>
             <a:fld id="{52E6D8D9-55A2-4063-B0F3-121F44549695}" type="datetimeFigureOut">
               <a:rPr lang="en-US" dirty="0"/>
-              <a:t>10/17/2019</a:t>
+              <a:t>10/17/19</a:t>
             </a:fld>
             <a:endParaRPr lang="en-US" dirty="0"/>
           </a:p>
@@ -2768,7 +2773,7 @@
           <a:p>
             <a:fld id="{D4B24536-994D-4021-A283-9F449C0DB509}" type="datetimeFigureOut">
               <a:rPr lang="en-US" dirty="0"/>
-              <a:t>10/17/2019</a:t>
+              <a:t>10/17/19</a:t>
             </a:fld>
             <a:endParaRPr lang="en-US" dirty="0"/>
           </a:p>
@@ -3676,7 +3681,7 @@
           <a:p>
             <a:fld id="{3CBBBB78-C96F-47B7-AB17-D852CA960AC9}" type="datetimeFigureOut">
               <a:rPr lang="en-US" dirty="0"/>
-              <a:t>10/17/2019</a:t>
+              <a:t>10/17/19</a:t>
             </a:fld>
             <a:endParaRPr lang="en-US" dirty="0"/>
           </a:p>
@@ -3984,7 +3989,7 @@
           <a:p>
             <a:fld id="{1FA3F48C-C7C6-4055-9F49-3777875E72AE}" type="datetimeFigureOut">
               <a:rPr lang="en-US" dirty="0"/>
-              <a:t>10/17/2019</a:t>
+              <a:t>10/17/19</a:t>
             </a:fld>
             <a:endParaRPr lang="en-US" dirty="0"/>
           </a:p>
@@ -4243,7 +4248,7 @@
           <a:p>
             <a:fld id="{6178E61D-D431-422C-9764-11DAFE33AB63}" type="datetimeFigureOut">
               <a:rPr lang="en-US" dirty="0"/>
-              <a:t>10/17/2019</a:t>
+              <a:t>10/17/19</a:t>
             </a:fld>
             <a:endParaRPr lang="en-US" dirty="0"/>
           </a:p>
@@ -4562,7 +4567,7 @@
           <a:p>
             <a:fld id="{12DE42F4-6EEF-4EF7-8ED4-2208F0F89A08}" type="datetimeFigureOut">
               <a:rPr lang="en-US" dirty="0"/>
-              <a:t>10/17/2019</a:t>
+              <a:t>10/17/19</a:t>
             </a:fld>
             <a:endParaRPr lang="en-US" dirty="0"/>
           </a:p>
@@ -4946,7 +4951,7 @@
           <a:p>
             <a:fld id="{30578ACC-22D6-47C1-A373-4FD133E34F3C}" type="datetimeFigureOut">
               <a:rPr lang="en-US" dirty="0"/>
-              <a:t>10/17/2019</a:t>
+              <a:t>10/17/19</a:t>
             </a:fld>
             <a:endParaRPr lang="en-US" dirty="0"/>
           </a:p>
@@ -5317,7 +5322,7 @@
           <a:p>
             <a:fld id="{4E5A6C69-6797-4E8A-BF37-F2C3751466E9}" type="datetimeFigureOut">
               <a:rPr lang="en-US" dirty="0"/>
-              <a:t>10/17/2019</a:t>
+              <a:t>10/17/19</a:t>
             </a:fld>
             <a:endParaRPr lang="en-US" dirty="0"/>
           </a:p>
@@ -5818,7 +5823,7 @@
           <a:p>
             <a:fld id="{D82014A1-A632-4878-A0D3-F52BA7563730}" type="datetimeFigureOut">
               <a:rPr lang="en-US" dirty="0"/>
-              <a:t>10/17/2019</a:t>
+              <a:t>10/17/19</a:t>
             </a:fld>
             <a:endParaRPr lang="en-US" dirty="0"/>
           </a:p>
@@ -6070,7 +6075,7 @@
           <a:p>
             <a:fld id="{CE99F462-093F-4566-844B-4C71F2739DA5}" type="datetimeFigureOut">
               <a:rPr lang="en-US" dirty="0"/>
-              <a:t>10/17/2019</a:t>
+              <a:t>10/17/19</a:t>
             </a:fld>
             <a:endParaRPr lang="en-US" dirty="0"/>
           </a:p>
@@ -6228,7 +6233,7 @@
           <a:p>
             <a:fld id="{3D24A7AC-904D-4781-85BA-7D10C17ED021}" type="datetimeFigureOut">
               <a:rPr lang="en-US" dirty="0"/>
-              <a:t>10/17/2019</a:t>
+              <a:t>10/17/19</a:t>
             </a:fld>
             <a:endParaRPr lang="en-US" dirty="0"/>
           </a:p>
@@ -6613,7 +6618,7 @@
           <a:p>
             <a:fld id="{E331444B-B92B-4E27-8C94-BB93EAF5CB18}" type="datetimeFigureOut">
               <a:rPr lang="en-US" dirty="0"/>
-              <a:t>10/17/2019</a:t>
+              <a:t>10/17/19</a:t>
             </a:fld>
             <a:endParaRPr lang="en-US" dirty="0"/>
           </a:p>
@@ -7017,7 +7022,7 @@
           <a:p>
             <a:fld id="{363EFA5E-FA76-400D-B3DC-F0BA90E6D107}" type="datetimeFigureOut">
               <a:rPr lang="en-US" dirty="0"/>
-              <a:t>10/17/2019</a:t>
+              <a:t>10/17/19</a:t>
             </a:fld>
             <a:endParaRPr lang="en-US" dirty="0"/>
           </a:p>
@@ -7256,7 +7261,7 @@
           <a:p>
             <a:fld id="{9D6E9DEC-419B-4CC5-A080-3B06BD5A8291}" type="datetimeFigureOut">
               <a:rPr lang="en-US" dirty="0"/>
-              <a:t>10/17/2019</a:t>
+              <a:t>10/17/19</a:t>
             </a:fld>
             <a:endParaRPr lang="en-US" dirty="0"/>
           </a:p>
@@ -8425,6 +8430,137 @@
           <p:cNvPr id="2" name="Title 1">
             <a:extLst>
               <a:ext uri="{FF2B5EF4-FFF2-40B4-BE49-F238E27FC236}">
+                <a16:creationId xmlns:a16="http://schemas.microsoft.com/office/drawing/2014/main" id="{C5158D2F-96C6-B440-99FD-A01CF475FAD9}"/>
+              </a:ext>
+            </a:extLst>
+          </p:cNvPr>
+          <p:cNvSpPr>
+            <a:spLocks noGrp="1"/>
+          </p:cNvSpPr>
+          <p:nvPr>
+            <p:ph type="title"/>
+          </p:nvPr>
+        </p:nvSpPr>
+        <p:spPr/>
+        <p:txBody>
+          <a:bodyPr/>
+          <a:lstStyle/>
+          <a:p>
+            <a:r>
+              <a:rPr lang="en-US" dirty="0"/>
+              <a:t>Our approach</a:t>
+            </a:r>
+          </a:p>
+        </p:txBody>
+      </p:sp>
+      <p:sp>
+        <p:nvSpPr>
+          <p:cNvPr id="3" name="Content Placeholder 2">
+            <a:extLst>
+              <a:ext uri="{FF2B5EF4-FFF2-40B4-BE49-F238E27FC236}">
+                <a16:creationId xmlns:a16="http://schemas.microsoft.com/office/drawing/2014/main" id="{C77A92F8-3F43-934D-8EE0-F6A5927917C1}"/>
+              </a:ext>
+            </a:extLst>
+          </p:cNvPr>
+          <p:cNvSpPr>
+            <a:spLocks noGrp="1"/>
+          </p:cNvSpPr>
+          <p:nvPr>
+            <p:ph idx="1"/>
+          </p:nvPr>
+        </p:nvSpPr>
+        <p:spPr/>
+        <p:txBody>
+          <a:bodyPr/>
+          <a:lstStyle/>
+          <a:p>
+            <a:r>
+              <a:rPr lang="en-US" dirty="0"/>
+              <a:t>Created </a:t>
+            </a:r>
+            <a:r>
+              <a:rPr lang="en-US" dirty="0" err="1"/>
+              <a:t>enum</a:t>
+            </a:r>
+            <a:r>
+              <a:rPr lang="en-US" dirty="0"/>
+              <a:t> classes for certain aspects of the game tiles:</a:t>
+            </a:r>
+          </a:p>
+          <a:p>
+            <a:pPr lvl="1"/>
+            <a:r>
+              <a:rPr lang="en-US" dirty="0"/>
+              <a:t>Direction, Shape, State</a:t>
+            </a:r>
+          </a:p>
+          <a:p>
+            <a:r>
+              <a:rPr lang="en-US" dirty="0"/>
+              <a:t>Created Tile class that utilized all </a:t>
+            </a:r>
+            <a:r>
+              <a:rPr lang="en-US"/>
+              <a:t>enums</a:t>
+            </a:r>
+          </a:p>
+          <a:p>
+            <a:r>
+              <a:rPr lang="en-US" dirty="0"/>
+              <a:t>Created ‘virtual’ game board array</a:t>
+            </a:r>
+          </a:p>
+          <a:p>
+            <a:pPr lvl="1"/>
+            <a:r>
+              <a:rPr lang="en-US" dirty="0"/>
+              <a:t>Useful for game logic and implementation of game</a:t>
+            </a:r>
+          </a:p>
+          <a:p>
+            <a:pPr lvl="1"/>
+            <a:endParaRPr lang="en-US" dirty="0"/>
+          </a:p>
+          <a:p>
+            <a:endParaRPr lang="en-US" dirty="0"/>
+          </a:p>
+        </p:txBody>
+      </p:sp>
+    </p:spTree>
+    <p:extLst>
+      <p:ext uri="{BB962C8B-B14F-4D97-AF65-F5344CB8AC3E}">
+        <p14:creationId xmlns:p14="http://schemas.microsoft.com/office/powerpoint/2010/main" val="4074742112"/>
+      </p:ext>
+    </p:extLst>
+  </p:cSld>
+  <p:clrMapOvr>
+    <a:masterClrMapping/>
+  </p:clrMapOvr>
+</p:sld>
+</file>
+
+<file path=ppt/slides/slide4.xml><?xml version="1.0" encoding="utf-8"?>
+<p:sld xmlns:a="http://schemas.openxmlformats.org/drawingml/2006/main" xmlns:r="http://schemas.openxmlformats.org/officeDocument/2006/relationships" xmlns:p="http://schemas.openxmlformats.org/presentationml/2006/main">
+  <p:cSld>
+    <p:spTree>
+      <p:nvGrpSpPr>
+        <p:cNvPr id="1" name=""/>
+        <p:cNvGrpSpPr/>
+        <p:nvPr/>
+      </p:nvGrpSpPr>
+      <p:grpSpPr>
+        <a:xfrm>
+          <a:off x="0" y="0"/>
+          <a:ext cx="0" cy="0"/>
+          <a:chOff x="0" y="0"/>
+          <a:chExt cx="0" cy="0"/>
+        </a:xfrm>
+      </p:grpSpPr>
+      <p:sp>
+        <p:nvSpPr>
+          <p:cNvPr id="2" name="Title 1">
+            <a:extLst>
+              <a:ext uri="{FF2B5EF4-FFF2-40B4-BE49-F238E27FC236}">
                 <a16:creationId xmlns:a16="http://schemas.microsoft.com/office/drawing/2014/main" id="{A64AE5DA-6CE4-4FE3-BA37-CD845840A561}"/>
               </a:ext>
             </a:extLst>
@@ -8443,7 +8579,7 @@
           <a:p>
             <a:r>
               <a:rPr lang="en-AU" dirty="0"/>
-              <a:t>Our Game</a:t>
+              <a:t>Our Game GUI</a:t>
             </a:r>
           </a:p>
         </p:txBody>
@@ -8490,7 +8626,596 @@
 </p:sld>
 </file>
 
-<file path=ppt/slides/slide4.xml><?xml version="1.0" encoding="utf-8"?>
+<file path=ppt/slides/slide5.xml><?xml version="1.0" encoding="utf-8"?>
+<p:sld xmlns:a="http://schemas.openxmlformats.org/drawingml/2006/main" xmlns:r="http://schemas.openxmlformats.org/officeDocument/2006/relationships" xmlns:p="http://schemas.openxmlformats.org/presentationml/2006/main">
+  <p:cSld>
+    <p:spTree>
+      <p:nvGrpSpPr>
+        <p:cNvPr id="1" name=""/>
+        <p:cNvGrpSpPr/>
+        <p:nvPr/>
+      </p:nvGrpSpPr>
+      <p:grpSpPr>
+        <a:xfrm>
+          <a:off x="0" y="0"/>
+          <a:ext cx="0" cy="0"/>
+          <a:chOff x="0" y="0"/>
+          <a:chExt cx="0" cy="0"/>
+        </a:xfrm>
+      </p:grpSpPr>
+      <p:sp>
+        <p:nvSpPr>
+          <p:cNvPr id="2" name="Title 1">
+            <a:extLst>
+              <a:ext uri="{FF2B5EF4-FFF2-40B4-BE49-F238E27FC236}">
+                <a16:creationId xmlns:a16="http://schemas.microsoft.com/office/drawing/2014/main" id="{4ED05305-C861-584D-800C-D69922173E87}"/>
+              </a:ext>
+            </a:extLst>
+          </p:cNvPr>
+          <p:cNvSpPr>
+            <a:spLocks noGrp="1"/>
+          </p:cNvSpPr>
+          <p:nvPr>
+            <p:ph type="title"/>
+          </p:nvPr>
+        </p:nvSpPr>
+        <p:spPr/>
+        <p:txBody>
+          <a:bodyPr/>
+          <a:lstStyle/>
+          <a:p>
+            <a:r>
+              <a:rPr lang="en-US" dirty="0"/>
+              <a:t>Usability</a:t>
+            </a:r>
+          </a:p>
+        </p:txBody>
+      </p:sp>
+      <p:sp>
+        <p:nvSpPr>
+          <p:cNvPr id="3" name="Content Placeholder 2">
+            <a:extLst>
+              <a:ext uri="{FF2B5EF4-FFF2-40B4-BE49-F238E27FC236}">
+                <a16:creationId xmlns:a16="http://schemas.microsoft.com/office/drawing/2014/main" id="{3F4DE0A8-0FF9-D649-A936-4BE1F097C663}"/>
+              </a:ext>
+            </a:extLst>
+          </p:cNvPr>
+          <p:cNvSpPr>
+            <a:spLocks noGrp="1"/>
+          </p:cNvSpPr>
+          <p:nvPr>
+            <p:ph idx="1"/>
+          </p:nvPr>
+        </p:nvSpPr>
+        <p:spPr/>
+        <p:txBody>
+          <a:bodyPr/>
+          <a:lstStyle/>
+          <a:p>
+            <a:r>
+              <a:rPr lang="en-US" dirty="0"/>
+              <a:t>Rotations via R key and scrolling</a:t>
+            </a:r>
+          </a:p>
+          <a:p>
+            <a:r>
+              <a:rPr lang="en-US" dirty="0"/>
+              <a:t>Clicking to remove pieces</a:t>
+            </a:r>
+          </a:p>
+          <a:p>
+            <a:r>
+              <a:rPr lang="en-US" dirty="0"/>
+              <a:t>Scaling tiles upon selection </a:t>
+            </a:r>
+          </a:p>
+        </p:txBody>
+      </p:sp>
+    </p:spTree>
+    <p:extLst>
+      <p:ext uri="{BB962C8B-B14F-4D97-AF65-F5344CB8AC3E}">
+        <p14:creationId xmlns:p14="http://schemas.microsoft.com/office/powerpoint/2010/main" val="3112012716"/>
+      </p:ext>
+    </p:extLst>
+  </p:cSld>
+  <p:clrMapOvr>
+    <a:masterClrMapping/>
+  </p:clrMapOvr>
+</p:sld>
+</file>
+
+<file path=ppt/slides/slide6.xml><?xml version="1.0" encoding="utf-8"?>
+<p:sld xmlns:a="http://schemas.openxmlformats.org/drawingml/2006/main" xmlns:r="http://schemas.openxmlformats.org/officeDocument/2006/relationships" xmlns:p="http://schemas.openxmlformats.org/presentationml/2006/main">
+  <p:cSld>
+    <p:spTree>
+      <p:nvGrpSpPr>
+        <p:cNvPr id="1" name=""/>
+        <p:cNvGrpSpPr/>
+        <p:nvPr/>
+      </p:nvGrpSpPr>
+      <p:grpSpPr>
+        <a:xfrm>
+          <a:off x="0" y="0"/>
+          <a:ext cx="0" cy="0"/>
+          <a:chOff x="0" y="0"/>
+          <a:chExt cx="0" cy="0"/>
+        </a:xfrm>
+      </p:grpSpPr>
+      <p:sp>
+        <p:nvSpPr>
+          <p:cNvPr id="2" name="Title 1">
+            <a:extLst>
+              <a:ext uri="{FF2B5EF4-FFF2-40B4-BE49-F238E27FC236}">
+                <a16:creationId xmlns:a16="http://schemas.microsoft.com/office/drawing/2014/main" id="{8720D3B3-4ADF-0844-9C25-EC000831CFAC}"/>
+              </a:ext>
+            </a:extLst>
+          </p:cNvPr>
+          <p:cNvSpPr>
+            <a:spLocks noGrp="1"/>
+          </p:cNvSpPr>
+          <p:nvPr>
+            <p:ph type="title"/>
+          </p:nvPr>
+        </p:nvSpPr>
+        <p:spPr/>
+        <p:txBody>
+          <a:bodyPr/>
+          <a:lstStyle/>
+          <a:p>
+            <a:r>
+              <a:rPr lang="en-US" dirty="0"/>
+              <a:t>Additional Features</a:t>
+            </a:r>
+          </a:p>
+        </p:txBody>
+      </p:sp>
+      <p:sp>
+        <p:nvSpPr>
+          <p:cNvPr id="3" name="Text Placeholder 2">
+            <a:extLst>
+              <a:ext uri="{FF2B5EF4-FFF2-40B4-BE49-F238E27FC236}">
+                <a16:creationId xmlns:a16="http://schemas.microsoft.com/office/drawing/2014/main" id="{2519D8DF-5027-8643-9683-657866EF4C17}"/>
+              </a:ext>
+            </a:extLst>
+          </p:cNvPr>
+          <p:cNvSpPr>
+            <a:spLocks noGrp="1"/>
+          </p:cNvSpPr>
+          <p:nvPr>
+            <p:ph type="body" idx="1"/>
+          </p:nvPr>
+        </p:nvSpPr>
+        <p:spPr/>
+        <p:txBody>
+          <a:bodyPr/>
+          <a:lstStyle/>
+          <a:p>
+            <a:r>
+              <a:rPr lang="en-US" dirty="0"/>
+              <a:t>Reset Board functionality</a:t>
+            </a:r>
+          </a:p>
+        </p:txBody>
+      </p:sp>
+      <p:pic>
+        <p:nvPicPr>
+          <p:cNvPr id="9" name="Content Placeholder 8">
+            <a:extLst>
+              <a:ext uri="{FF2B5EF4-FFF2-40B4-BE49-F238E27FC236}">
+                <a16:creationId xmlns:a16="http://schemas.microsoft.com/office/drawing/2014/main" id="{EB97D94A-F2D3-E549-999C-729C1C298131}"/>
+              </a:ext>
+            </a:extLst>
+          </p:cNvPr>
+          <p:cNvPicPr>
+            <a:picLocks noGrp="1" noChangeAspect="1"/>
+          </p:cNvPicPr>
+          <p:nvPr>
+            <p:ph sz="half" idx="2"/>
+          </p:nvPr>
+        </p:nvPicPr>
+        <p:blipFill>
+          <a:blip r:embed="rId2"/>
+          <a:stretch>
+            <a:fillRect/>
+          </a:stretch>
+        </p:blipFill>
+        <p:spPr>
+          <a:xfrm>
+            <a:off x="6096000" y="3028949"/>
+            <a:ext cx="3460516" cy="2905125"/>
+          </a:xfrm>
+        </p:spPr>
+      </p:pic>
+      <p:sp>
+        <p:nvSpPr>
+          <p:cNvPr id="5" name="Text Placeholder 4">
+            <a:extLst>
+              <a:ext uri="{FF2B5EF4-FFF2-40B4-BE49-F238E27FC236}">
+                <a16:creationId xmlns:a16="http://schemas.microsoft.com/office/drawing/2014/main" id="{08844EF1-5AA4-504E-9667-5C14BE8D7196}"/>
+              </a:ext>
+            </a:extLst>
+          </p:cNvPr>
+          <p:cNvSpPr>
+            <a:spLocks noGrp="1"/>
+          </p:cNvSpPr>
+          <p:nvPr>
+            <p:ph type="body" sz="quarter" idx="3"/>
+          </p:nvPr>
+        </p:nvSpPr>
+        <p:spPr/>
+        <p:txBody>
+          <a:bodyPr/>
+          <a:lstStyle/>
+          <a:p>
+            <a:r>
+              <a:rPr lang="en-US" dirty="0"/>
+              <a:t>How to play instructions</a:t>
+            </a:r>
+          </a:p>
+        </p:txBody>
+      </p:sp>
+      <p:pic>
+        <p:nvPicPr>
+          <p:cNvPr id="7" name="Picture 6">
+            <a:extLst>
+              <a:ext uri="{FF2B5EF4-FFF2-40B4-BE49-F238E27FC236}">
+                <a16:creationId xmlns:a16="http://schemas.microsoft.com/office/drawing/2014/main" id="{947BD77C-5E25-6944-9DF7-948E096C4170}"/>
+              </a:ext>
+            </a:extLst>
+          </p:cNvPr>
+          <p:cNvPicPr>
+            <a:picLocks noChangeAspect="1"/>
+          </p:cNvPicPr>
+          <p:nvPr/>
+        </p:nvPicPr>
+        <p:blipFill>
+          <a:blip r:embed="rId3"/>
+          <a:stretch>
+            <a:fillRect/>
+          </a:stretch>
+        </p:blipFill>
+        <p:spPr>
+          <a:xfrm>
+            <a:off x="800443" y="3327744"/>
+            <a:ext cx="4165600" cy="2006600"/>
+          </a:xfrm>
+          <a:prstGeom prst="rect">
+            <a:avLst/>
+          </a:prstGeom>
+        </p:spPr>
+      </p:pic>
+    </p:spTree>
+    <p:extLst>
+      <p:ext uri="{BB962C8B-B14F-4D97-AF65-F5344CB8AC3E}">
+        <p14:creationId xmlns:p14="http://schemas.microsoft.com/office/powerpoint/2010/main" val="4040728412"/>
+      </p:ext>
+    </p:extLst>
+  </p:cSld>
+  <p:clrMapOvr>
+    <a:masterClrMapping/>
+  </p:clrMapOvr>
+</p:sld>
+</file>
+
+<file path=ppt/slides/slide7.xml><?xml version="1.0" encoding="utf-8"?>
+<p:sld xmlns:a="http://schemas.openxmlformats.org/drawingml/2006/main" xmlns:r="http://schemas.openxmlformats.org/officeDocument/2006/relationships" xmlns:p="http://schemas.openxmlformats.org/presentationml/2006/main">
+  <p:cSld>
+    <p:spTree>
+      <p:nvGrpSpPr>
+        <p:cNvPr id="1" name=""/>
+        <p:cNvGrpSpPr/>
+        <p:nvPr/>
+      </p:nvGrpSpPr>
+      <p:grpSpPr>
+        <a:xfrm>
+          <a:off x="0" y="0"/>
+          <a:ext cx="0" cy="0"/>
+          <a:chOff x="0" y="0"/>
+          <a:chExt cx="0" cy="0"/>
+        </a:xfrm>
+      </p:grpSpPr>
+      <p:sp>
+        <p:nvSpPr>
+          <p:cNvPr id="2" name="Title 1">
+            <a:extLst>
+              <a:ext uri="{FF2B5EF4-FFF2-40B4-BE49-F238E27FC236}">
+                <a16:creationId xmlns:a16="http://schemas.microsoft.com/office/drawing/2014/main" id="{8720D3B3-4ADF-0844-9C25-EC000831CFAC}"/>
+              </a:ext>
+            </a:extLst>
+          </p:cNvPr>
+          <p:cNvSpPr>
+            <a:spLocks noGrp="1"/>
+          </p:cNvSpPr>
+          <p:nvPr>
+            <p:ph type="title"/>
+          </p:nvPr>
+        </p:nvSpPr>
+        <p:spPr/>
+        <p:txBody>
+          <a:bodyPr/>
+          <a:lstStyle/>
+          <a:p>
+            <a:r>
+              <a:rPr lang="en-US" dirty="0"/>
+              <a:t>Additional Features</a:t>
+            </a:r>
+          </a:p>
+        </p:txBody>
+      </p:sp>
+      <p:sp>
+        <p:nvSpPr>
+          <p:cNvPr id="3" name="Text Placeholder 2">
+            <a:extLst>
+              <a:ext uri="{FF2B5EF4-FFF2-40B4-BE49-F238E27FC236}">
+                <a16:creationId xmlns:a16="http://schemas.microsoft.com/office/drawing/2014/main" id="{2519D8DF-5027-8643-9683-657866EF4C17}"/>
+              </a:ext>
+            </a:extLst>
+          </p:cNvPr>
+          <p:cNvSpPr>
+            <a:spLocks noGrp="1"/>
+          </p:cNvSpPr>
+          <p:nvPr>
+            <p:ph type="body" idx="1"/>
+          </p:nvPr>
+        </p:nvSpPr>
+        <p:spPr/>
+        <p:txBody>
+          <a:bodyPr/>
+          <a:lstStyle/>
+          <a:p>
+            <a:r>
+              <a:rPr lang="en-US" dirty="0"/>
+              <a:t>Drag and drop preview</a:t>
+            </a:r>
+          </a:p>
+        </p:txBody>
+      </p:sp>
+      <p:sp>
+        <p:nvSpPr>
+          <p:cNvPr id="5" name="Text Placeholder 4">
+            <a:extLst>
+              <a:ext uri="{FF2B5EF4-FFF2-40B4-BE49-F238E27FC236}">
+                <a16:creationId xmlns:a16="http://schemas.microsoft.com/office/drawing/2014/main" id="{08844EF1-5AA4-504E-9667-5C14BE8D7196}"/>
+              </a:ext>
+            </a:extLst>
+          </p:cNvPr>
+          <p:cNvSpPr>
+            <a:spLocks noGrp="1"/>
+          </p:cNvSpPr>
+          <p:nvPr>
+            <p:ph type="body" sz="quarter" idx="3"/>
+          </p:nvPr>
+        </p:nvSpPr>
+        <p:spPr/>
+        <p:txBody>
+          <a:bodyPr/>
+          <a:lstStyle/>
+          <a:p>
+            <a:r>
+              <a:rPr lang="en-US" dirty="0"/>
+              <a:t>Difficulty selection</a:t>
+            </a:r>
+          </a:p>
+        </p:txBody>
+      </p:sp>
+      <p:pic>
+        <p:nvPicPr>
+          <p:cNvPr id="7" name="Picture 6">
+            <a:extLst>
+              <a:ext uri="{FF2B5EF4-FFF2-40B4-BE49-F238E27FC236}">
+                <a16:creationId xmlns:a16="http://schemas.microsoft.com/office/drawing/2014/main" id="{F7B1DF68-7CB2-754B-A607-C6C5E20D900B}"/>
+              </a:ext>
+            </a:extLst>
+          </p:cNvPr>
+          <p:cNvPicPr>
+            <a:picLocks noChangeAspect="1"/>
+          </p:cNvPicPr>
+          <p:nvPr/>
+        </p:nvPicPr>
+        <p:blipFill rotWithShape="1">
+          <a:blip r:embed="rId2"/>
+          <a:srcRect l="7620" t="6127" r="49665" b="46268"/>
+          <a:stretch/>
+        </p:blipFill>
+        <p:spPr>
+          <a:xfrm>
+            <a:off x="1089468" y="3172253"/>
+            <a:ext cx="3507245" cy="2442960"/>
+          </a:xfrm>
+          <a:prstGeom prst="rect">
+            <a:avLst/>
+          </a:prstGeom>
+        </p:spPr>
+      </p:pic>
+      <p:pic>
+        <p:nvPicPr>
+          <p:cNvPr id="8" name="Picture 7">
+            <a:extLst>
+              <a:ext uri="{FF2B5EF4-FFF2-40B4-BE49-F238E27FC236}">
+                <a16:creationId xmlns:a16="http://schemas.microsoft.com/office/drawing/2014/main" id="{A83DE0D4-F8A8-7941-8403-1221694EE1DC}"/>
+              </a:ext>
+            </a:extLst>
+          </p:cNvPr>
+          <p:cNvPicPr>
+            <a:picLocks noChangeAspect="1"/>
+          </p:cNvPicPr>
+          <p:nvPr/>
+        </p:nvPicPr>
+        <p:blipFill>
+          <a:blip r:embed="rId3"/>
+          <a:stretch>
+            <a:fillRect/>
+          </a:stretch>
+        </p:blipFill>
+        <p:spPr>
+          <a:xfrm>
+            <a:off x="5787823" y="3042679"/>
+            <a:ext cx="4273332" cy="2702107"/>
+          </a:xfrm>
+          <a:prstGeom prst="rect">
+            <a:avLst/>
+          </a:prstGeom>
+        </p:spPr>
+      </p:pic>
+    </p:spTree>
+    <p:extLst>
+      <p:ext uri="{BB962C8B-B14F-4D97-AF65-F5344CB8AC3E}">
+        <p14:creationId xmlns:p14="http://schemas.microsoft.com/office/powerpoint/2010/main" val="2495494722"/>
+      </p:ext>
+    </p:extLst>
+  </p:cSld>
+  <p:clrMapOvr>
+    <a:masterClrMapping/>
+  </p:clrMapOvr>
+</p:sld>
+</file>
+
+<file path=ppt/slides/slide8.xml><?xml version="1.0" encoding="utf-8"?>
+<p:sld xmlns:a="http://schemas.openxmlformats.org/drawingml/2006/main" xmlns:r="http://schemas.openxmlformats.org/officeDocument/2006/relationships" xmlns:p="http://schemas.openxmlformats.org/presentationml/2006/main">
+  <p:cSld>
+    <p:spTree>
+      <p:nvGrpSpPr>
+        <p:cNvPr id="1" name=""/>
+        <p:cNvGrpSpPr/>
+        <p:nvPr/>
+      </p:nvGrpSpPr>
+      <p:grpSpPr>
+        <a:xfrm>
+          <a:off x="0" y="0"/>
+          <a:ext cx="0" cy="0"/>
+          <a:chOff x="0" y="0"/>
+          <a:chExt cx="0" cy="0"/>
+        </a:xfrm>
+      </p:grpSpPr>
+      <p:sp>
+        <p:nvSpPr>
+          <p:cNvPr id="2" name="Title 1">
+            <a:extLst>
+              <a:ext uri="{FF2B5EF4-FFF2-40B4-BE49-F238E27FC236}">
+                <a16:creationId xmlns:a16="http://schemas.microsoft.com/office/drawing/2014/main" id="{8720D3B3-4ADF-0844-9C25-EC000831CFAC}"/>
+              </a:ext>
+            </a:extLst>
+          </p:cNvPr>
+          <p:cNvSpPr>
+            <a:spLocks noGrp="1"/>
+          </p:cNvSpPr>
+          <p:nvPr>
+            <p:ph type="title"/>
+          </p:nvPr>
+        </p:nvSpPr>
+        <p:spPr/>
+        <p:txBody>
+          <a:bodyPr/>
+          <a:lstStyle/>
+          <a:p>
+            <a:r>
+              <a:rPr lang="en-US" dirty="0"/>
+              <a:t>Additional Features</a:t>
+            </a:r>
+          </a:p>
+        </p:txBody>
+      </p:sp>
+      <p:sp>
+        <p:nvSpPr>
+          <p:cNvPr id="3" name="Text Placeholder 2">
+            <a:extLst>
+              <a:ext uri="{FF2B5EF4-FFF2-40B4-BE49-F238E27FC236}">
+                <a16:creationId xmlns:a16="http://schemas.microsoft.com/office/drawing/2014/main" id="{2519D8DF-5027-8643-9683-657866EF4C17}"/>
+              </a:ext>
+            </a:extLst>
+          </p:cNvPr>
+          <p:cNvSpPr>
+            <a:spLocks noGrp="1"/>
+          </p:cNvSpPr>
+          <p:nvPr>
+            <p:ph type="body" idx="1"/>
+          </p:nvPr>
+        </p:nvSpPr>
+        <p:spPr/>
+        <p:txBody>
+          <a:bodyPr>
+            <a:normAutofit lnSpcReduction="10000"/>
+          </a:bodyPr>
+          <a:lstStyle/>
+          <a:p>
+            <a:r>
+              <a:rPr lang="en-US" dirty="0"/>
+              <a:t>Challenge completed feedback</a:t>
+            </a:r>
+          </a:p>
+        </p:txBody>
+      </p:sp>
+      <p:sp>
+        <p:nvSpPr>
+          <p:cNvPr id="6" name="Text Placeholder 5">
+            <a:extLst>
+              <a:ext uri="{FF2B5EF4-FFF2-40B4-BE49-F238E27FC236}">
+                <a16:creationId xmlns:a16="http://schemas.microsoft.com/office/drawing/2014/main" id="{8DCAA8ED-5D3B-C340-A6EA-F9464587C728}"/>
+              </a:ext>
+            </a:extLst>
+          </p:cNvPr>
+          <p:cNvSpPr>
+            <a:spLocks noGrp="1"/>
+          </p:cNvSpPr>
+          <p:nvPr>
+            <p:ph type="body" sz="quarter" idx="3"/>
+          </p:nvPr>
+        </p:nvSpPr>
+        <p:spPr/>
+        <p:txBody>
+          <a:bodyPr>
+            <a:normAutofit lnSpcReduction="10000"/>
+          </a:bodyPr>
+          <a:lstStyle/>
+          <a:p>
+            <a:endParaRPr lang="en-US"/>
+          </a:p>
+        </p:txBody>
+      </p:sp>
+      <p:pic>
+        <p:nvPicPr>
+          <p:cNvPr id="9" name="Picture 8">
+            <a:extLst>
+              <a:ext uri="{FF2B5EF4-FFF2-40B4-BE49-F238E27FC236}">
+                <a16:creationId xmlns:a16="http://schemas.microsoft.com/office/drawing/2014/main" id="{F5ED3A1E-BF63-7F4D-87DF-14439DA35644}"/>
+              </a:ext>
+            </a:extLst>
+          </p:cNvPr>
+          <p:cNvPicPr>
+            <a:picLocks noChangeAspect="1"/>
+          </p:cNvPicPr>
+          <p:nvPr/>
+        </p:nvPicPr>
+        <p:blipFill>
+          <a:blip r:embed="rId2"/>
+          <a:stretch>
+            <a:fillRect/>
+          </a:stretch>
+        </p:blipFill>
+        <p:spPr>
+          <a:xfrm>
+            <a:off x="5820154" y="2336873"/>
+            <a:ext cx="3901625" cy="3911428"/>
+          </a:xfrm>
+          <a:prstGeom prst="rect">
+            <a:avLst/>
+          </a:prstGeom>
+        </p:spPr>
+      </p:pic>
+    </p:spTree>
+    <p:extLst>
+      <p:ext uri="{BB962C8B-B14F-4D97-AF65-F5344CB8AC3E}">
+        <p14:creationId xmlns:p14="http://schemas.microsoft.com/office/powerpoint/2010/main" val="3655071405"/>
+      </p:ext>
+    </p:extLst>
+  </p:cSld>
+  <p:clrMapOvr>
+    <a:masterClrMapping/>
+  </p:clrMapOvr>
+</p:sld>
+</file>
+
+<file path=ppt/slides/slide9.xml><?xml version="1.0" encoding="utf-8"?>
 <p:sld xmlns:a="http://schemas.openxmlformats.org/drawingml/2006/main" xmlns:r="http://schemas.openxmlformats.org/officeDocument/2006/relationships" xmlns:p="http://schemas.openxmlformats.org/presentationml/2006/main">
   <p:cSld>
     <p:spTree>

</xml_diff>